<commit_message>
final presentation once more
</commit_message>
<xml_diff>
--- a/Documents/Fall Presentation.pptx
+++ b/Documents/Fall Presentation.pptx
@@ -781,11 +781,7 @@
           <a:p>
             <a:r>
               <a:rPr lang="en-US" dirty="0" smtClean="0"/>
-              <a:t>-  </a:t>
-            </a:r>
-            <a:r>
-              <a:rPr lang="en-US" dirty="0" smtClean="0"/>
-              <a:t>formative usability study (give the tool to a bunch of people, and give them a questionnaire at the end)</a:t>
+              <a:t>-  formative usability study (give the tool to a bunch of people, and give them a questionnaire at the end)</a:t>
             </a:r>
           </a:p>
           <a:p>
@@ -795,13 +791,8 @@
             </a:pPr>
             <a:r>
               <a:rPr lang="en-US" dirty="0" smtClean="0"/>
-              <a:t>summative usability study (observe each user at a time, more </a:t>
-            </a:r>
-            <a:r>
-              <a:rPr lang="en-US" dirty="0" smtClean="0"/>
-              <a:t>detailed)</a:t>
-            </a:r>
-            <a:endParaRPr lang="en-US" dirty="0" smtClean="0"/>
+              <a:t>summative usability study (observe each user at a time, more detailed)</a:t>
+            </a:r>
           </a:p>
           <a:p>
             <a:pPr marL="0" indent="0">
@@ -917,11 +908,7 @@
           <a:p>
             <a:r>
               <a:rPr lang="en-US" baseline="0" dirty="0" smtClean="0"/>
-              <a:t>CFG gives us more info to infer off </a:t>
-            </a:r>
-            <a:r>
-              <a:rPr lang="en-US" baseline="0" dirty="0" smtClean="0"/>
-              <a:t>of</a:t>
+              <a:t>CFG gives us more info to infer off of</a:t>
             </a:r>
             <a:endParaRPr lang="en-US" dirty="0" smtClean="0"/>
           </a:p>
@@ -1011,7 +998,6 @@
               <a:rPr lang="en-US" dirty="0" smtClean="0"/>
               <a:t>Kurtis</a:t>
             </a:r>
-            <a:endParaRPr lang="en-US" dirty="0" smtClean="0"/>
           </a:p>
         </p:txBody>
       </p:sp>
@@ -1099,7 +1085,6 @@
               <a:rPr lang="en-US" dirty="0" smtClean="0"/>
               <a:t>Richard</a:t>
             </a:r>
-            <a:endParaRPr lang="en-US" dirty="0" smtClean="0"/>
           </a:p>
         </p:txBody>
       </p:sp>
@@ -1198,11 +1183,7 @@
             </a:r>
             <a:r>
               <a:rPr lang="en-US" baseline="0" dirty="0" smtClean="0"/>
-              <a:t> you useful information in a given </a:t>
-            </a:r>
-            <a:r>
-              <a:rPr lang="en-US" baseline="0" dirty="0" smtClean="0"/>
-              <a:t>context</a:t>
+              <a:t> you useful information in a given context</a:t>
             </a:r>
             <a:endParaRPr lang="en-US" dirty="0" smtClean="0"/>
           </a:p>
@@ -5189,15 +5170,7 @@
             </a:pPr>
             <a:r>
               <a:rPr lang="en-US" sz="3200" dirty="0" smtClean="0"/>
-              <a:t>pq</a:t>
-            </a:r>
-            <a:r>
-              <a:rPr lang="en-US" sz="3200" dirty="0" smtClean="0"/>
-              <a:t>-Gram				Similarity </a:t>
-            </a:r>
-            <a:r>
-              <a:rPr lang="en-US" sz="3200" dirty="0" smtClean="0"/>
-              <a:t>matrix</a:t>
+              <a:t>pq-Gram				Similarity matrix</a:t>
             </a:r>
           </a:p>
         </p:txBody>
@@ -5497,15 +5470,7 @@
           <a:p>
             <a:r>
               <a:rPr lang="en-US" sz="2800" dirty="0" smtClean="0"/>
-              <a:t>Produce </a:t>
-            </a:r>
-            <a:r>
-              <a:rPr lang="en-US" sz="2800" dirty="0" smtClean="0"/>
-              <a:t>abstract </a:t>
-            </a:r>
-            <a:r>
-              <a:rPr lang="en-US" sz="2800" dirty="0" smtClean="0"/>
-              <a:t>syntax tree using Java Development Tools</a:t>
+              <a:t>Produce abstract syntax tree using Java Development Tools</a:t>
             </a:r>
           </a:p>
         </p:txBody>
@@ -5694,15 +5659,7 @@
           <a:p>
             <a:r>
               <a:rPr lang="en-US" sz="2800" dirty="0" smtClean="0"/>
-              <a:t>Pattern </a:t>
-            </a:r>
-            <a:r>
-              <a:rPr lang="en-US" sz="2800" dirty="0" smtClean="0"/>
-              <a:t>Definition </a:t>
-            </a:r>
-            <a:r>
-              <a:rPr lang="en-US" sz="2800" dirty="0" smtClean="0"/>
-              <a:t>Language</a:t>
+              <a:t>Pattern Definition Language</a:t>
             </a:r>
           </a:p>
           <a:p>
@@ -6392,7 +6349,6 @@
               <a:rPr lang="en-US" dirty="0"/>
               <a:t>E</a:t>
             </a:r>
-            <a:endParaRPr lang="en-US" dirty="0"/>
           </a:p>
         </p:txBody>
       </p:sp>
@@ -6436,7 +6392,6 @@
               <a:rPr lang="en-US" dirty="0"/>
               <a:t>B</a:t>
             </a:r>
-            <a:endParaRPr lang="en-US" dirty="0"/>
           </a:p>
         </p:txBody>
       </p:sp>
@@ -6480,7 +6435,6 @@
               <a:rPr lang="en-US" dirty="0"/>
               <a:t>D</a:t>
             </a:r>
-            <a:endParaRPr lang="en-US" dirty="0"/>
           </a:p>
         </p:txBody>
       </p:sp>
@@ -6796,7 +6750,6 @@
               <a:rPr lang="en-US" dirty="0"/>
               <a:t>E</a:t>
             </a:r>
-            <a:endParaRPr lang="en-US" dirty="0"/>
           </a:p>
         </p:txBody>
       </p:sp>
@@ -6840,7 +6793,6 @@
               <a:rPr lang="en-US" dirty="0"/>
               <a:t>B</a:t>
             </a:r>
-            <a:endParaRPr lang="en-US" dirty="0"/>
           </a:p>
         </p:txBody>
       </p:sp>
@@ -6960,7 +6912,7 @@
         </p:nvSpPr>
         <p:spPr>
           <a:xfrm flipH="1">
-            <a:off x="4760257" y="4797382"/>
+            <a:off x="4388401" y="4769950"/>
             <a:ext cx="533400" cy="384980"/>
           </a:xfrm>
           <a:prstGeom prst="rightArrow">
@@ -7000,7 +6952,7 @@
         </p:nvSpPr>
         <p:spPr>
           <a:xfrm>
-            <a:off x="6265164" y="3989832"/>
+            <a:off x="5807964" y="3962400"/>
             <a:ext cx="431292" cy="431292"/>
           </a:xfrm>
           <a:prstGeom prst="ellipse">
@@ -7044,7 +6996,7 @@
         </p:nvSpPr>
         <p:spPr>
           <a:xfrm>
-            <a:off x="6722364" y="4751070"/>
+            <a:off x="6265164" y="4723638"/>
             <a:ext cx="431292" cy="431292"/>
           </a:xfrm>
           <a:prstGeom prst="ellipse">
@@ -7088,7 +7040,7 @@
         </p:nvSpPr>
         <p:spPr>
           <a:xfrm>
-            <a:off x="5807964" y="5563362"/>
+            <a:off x="5350764" y="5535930"/>
             <a:ext cx="431292" cy="431292"/>
           </a:xfrm>
           <a:prstGeom prst="ellipse">
@@ -7120,7 +7072,6 @@
               <a:rPr lang="en-US" dirty="0"/>
               <a:t>E</a:t>
             </a:r>
-            <a:endParaRPr lang="en-US" dirty="0"/>
           </a:p>
         </p:txBody>
       </p:sp>
@@ -7132,7 +7083,7 @@
         </p:nvSpPr>
         <p:spPr>
           <a:xfrm>
-            <a:off x="5808683" y="4771899"/>
+            <a:off x="5351483" y="4744467"/>
             <a:ext cx="431292" cy="431292"/>
           </a:xfrm>
           <a:prstGeom prst="ellipse">
@@ -7164,7 +7115,6 @@
               <a:rPr lang="en-US" dirty="0"/>
               <a:t>B</a:t>
             </a:r>
-            <a:endParaRPr lang="en-US" dirty="0"/>
           </a:p>
         </p:txBody>
       </p:sp>
@@ -7176,7 +7126,7 @@
         </p:nvSpPr>
         <p:spPr>
           <a:xfrm>
-            <a:off x="6731508" y="5541264"/>
+            <a:off x="6274308" y="5513832"/>
             <a:ext cx="431292" cy="431292"/>
           </a:xfrm>
           <a:prstGeom prst="ellipse">
@@ -7223,7 +7173,7 @@
         </p:nvCxnSpPr>
         <p:spPr>
           <a:xfrm flipH="1">
-            <a:off x="6024329" y="4357963"/>
+            <a:off x="5567129" y="4330531"/>
             <a:ext cx="303996" cy="413936"/>
           </a:xfrm>
           <a:prstGeom prst="straightConnector1">
@@ -7259,7 +7209,7 @@
         </p:nvCxnSpPr>
         <p:spPr>
           <a:xfrm>
-            <a:off x="6633295" y="4357963"/>
+            <a:off x="6176095" y="4330531"/>
             <a:ext cx="304715" cy="393107"/>
           </a:xfrm>
           <a:prstGeom prst="straightConnector1">
@@ -7295,7 +7245,7 @@
         </p:nvCxnSpPr>
         <p:spPr>
           <a:xfrm>
-            <a:off x="6938010" y="5182362"/>
+            <a:off x="6480810" y="5154930"/>
             <a:ext cx="9144" cy="358902"/>
           </a:xfrm>
           <a:prstGeom prst="straightConnector1">
@@ -7331,7 +7281,7 @@
         </p:nvCxnSpPr>
         <p:spPr>
           <a:xfrm flipH="1">
-            <a:off x="6023610" y="5203191"/>
+            <a:off x="5566410" y="5175759"/>
             <a:ext cx="719" cy="360171"/>
           </a:xfrm>
           <a:prstGeom prst="straightConnector1">
@@ -7364,7 +7314,7 @@
         </p:nvSpPr>
         <p:spPr>
           <a:xfrm>
-            <a:off x="5858256" y="1856232"/>
+            <a:off x="5410200" y="1856232"/>
             <a:ext cx="1139190" cy="369332"/>
           </a:xfrm>
           <a:prstGeom prst="rect">
@@ -7394,7 +7344,7 @@
         </p:nvSpPr>
         <p:spPr>
           <a:xfrm flipV="1">
-            <a:off x="5935133" y="2389632"/>
+            <a:off x="5487077" y="2389632"/>
             <a:ext cx="761323" cy="791463"/>
           </a:xfrm>
           <a:prstGeom prst="bentUpArrow">
@@ -7438,7 +7388,7 @@
         </p:nvSpPr>
         <p:spPr>
           <a:xfrm>
-            <a:off x="4258056" y="4306300"/>
+            <a:off x="3886200" y="4278868"/>
             <a:ext cx="1600200" cy="369332"/>
           </a:xfrm>
           <a:prstGeom prst="rect">
@@ -7498,7 +7448,7 @@
         </p:nvSpPr>
         <p:spPr>
           <a:xfrm>
-            <a:off x="3302508" y="4014978"/>
+            <a:off x="2988564" y="3987546"/>
             <a:ext cx="431292" cy="431292"/>
           </a:xfrm>
           <a:prstGeom prst="ellipse">
@@ -7541,7 +7491,7 @@
         </p:nvSpPr>
         <p:spPr>
           <a:xfrm>
-            <a:off x="3759708" y="4776216"/>
+            <a:off x="3445764" y="4748784"/>
             <a:ext cx="431292" cy="431292"/>
           </a:xfrm>
           <a:prstGeom prst="ellipse">
@@ -7585,7 +7535,7 @@
         </p:nvSpPr>
         <p:spPr>
           <a:xfrm>
-            <a:off x="2845308" y="5588508"/>
+            <a:off x="2531364" y="5561076"/>
             <a:ext cx="431292" cy="431292"/>
           </a:xfrm>
           <a:prstGeom prst="ellipse">
@@ -7617,7 +7567,6 @@
               <a:rPr lang="en-US" dirty="0"/>
               <a:t>E</a:t>
             </a:r>
-            <a:endParaRPr lang="en-US" dirty="0"/>
           </a:p>
         </p:txBody>
       </p:sp>
@@ -7629,7 +7578,7 @@
         </p:nvSpPr>
         <p:spPr>
           <a:xfrm>
-            <a:off x="2846027" y="4797045"/>
+            <a:off x="2532083" y="4769613"/>
             <a:ext cx="431292" cy="431292"/>
           </a:xfrm>
           <a:prstGeom prst="ellipse">
@@ -7661,7 +7610,6 @@
               <a:rPr lang="en-US" dirty="0"/>
               <a:t>B</a:t>
             </a:r>
-            <a:endParaRPr lang="en-US" dirty="0"/>
           </a:p>
         </p:txBody>
       </p:sp>
@@ -7673,7 +7621,7 @@
         </p:nvSpPr>
         <p:spPr>
           <a:xfrm>
-            <a:off x="3768852" y="5566410"/>
+            <a:off x="3454908" y="5538978"/>
             <a:ext cx="431292" cy="431292"/>
           </a:xfrm>
           <a:prstGeom prst="ellipse">
@@ -7720,7 +7668,7 @@
         </p:nvCxnSpPr>
         <p:spPr>
           <a:xfrm flipH="1">
-            <a:off x="3061673" y="4383109"/>
+            <a:off x="2747729" y="4355677"/>
             <a:ext cx="303996" cy="413936"/>
           </a:xfrm>
           <a:prstGeom prst="straightConnector1">
@@ -7756,7 +7704,7 @@
         </p:nvCxnSpPr>
         <p:spPr>
           <a:xfrm>
-            <a:off x="3670639" y="4383109"/>
+            <a:off x="3356695" y="4355677"/>
             <a:ext cx="304715" cy="393107"/>
           </a:xfrm>
           <a:prstGeom prst="straightConnector1">
@@ -7792,7 +7740,7 @@
         </p:nvCxnSpPr>
         <p:spPr>
           <a:xfrm>
-            <a:off x="3975354" y="5207508"/>
+            <a:off x="3661410" y="5180076"/>
             <a:ext cx="9144" cy="358902"/>
           </a:xfrm>
           <a:prstGeom prst="straightConnector1">
@@ -7828,7 +7776,7 @@
         </p:nvCxnSpPr>
         <p:spPr>
           <a:xfrm flipH="1">
-            <a:off x="3060954" y="5228337"/>
+            <a:off x="2747010" y="5200905"/>
             <a:ext cx="719" cy="360171"/>
           </a:xfrm>
           <a:prstGeom prst="straightConnector1">
@@ -10048,7 +9996,6 @@
               <a:rPr lang="en-US" sz="2000" dirty="0" smtClean="0"/>
               <a:t>)</a:t>
             </a:r>
-            <a:endParaRPr lang="en-US" sz="2000" dirty="0" smtClean="0"/>
           </a:p>
           <a:p>
             <a:r>
@@ -10066,16 +10013,11 @@
               <a:rPr lang="en-US" sz="3200" dirty="0" smtClean="0"/>
               <a:t>Similarity matrix</a:t>
             </a:r>
-            <a:endParaRPr lang="en-US" sz="3200" dirty="0" smtClean="0"/>
           </a:p>
           <a:p>
             <a:r>
               <a:rPr lang="en-US" sz="3200" dirty="0" smtClean="0"/>
-              <a:t>pq</a:t>
-            </a:r>
-            <a:r>
-              <a:rPr lang="en-US" sz="3200" dirty="0" smtClean="0"/>
-              <a:t>-Gram </a:t>
+              <a:t>pq-Gram </a:t>
             </a:r>
             <a:r>
               <a:rPr lang="en-US" sz="2000" dirty="0" smtClean="0"/>

</xml_diff>